<commit_message>
maj create timescaledb and code asssociated
</commit_message>
<xml_diff>
--- a/python-receipt-ocr/features.pptx
+++ b/python-receipt-ocr/features.pptx
@@ -6,6 +6,8 @@
   </p:sldMasterIdLst>
   <p:sldIdLst>
     <p:sldId id="257" r:id="rId2"/>
+    <p:sldId id="258" r:id="rId3"/>
+    <p:sldId id="259" r:id="rId4"/>
   </p:sldIdLst>
   <p:sldSz cx="12192000" cy="6858000"/>
   <p:notesSz cx="6858000" cy="9144000"/>
@@ -104,6 +106,11 @@
       </a:defRPr>
     </a:lvl9pPr>
   </p:defaultTextStyle>
+  <p:extLst>
+    <p:ext uri="{EFAFB233-063F-42B5-8137-9DF3F51BA10A}">
+      <p15:sldGuideLst xmlns:p15="http://schemas.microsoft.com/office/powerpoint/2012/main"/>
+    </p:ext>
+  </p:extLst>
 </p:presentation>
 </file>
 
@@ -256,7 +263,7 @@
           <a:p>
             <a:fld id="{FBCC5ECE-D7AB-49AB-A6D7-17BB3AE79EA8}" type="datetimeFigureOut">
               <a:rPr lang="en-GB" smtClean="0"/>
-              <a:t>06/07/2023</a:t>
+              <a:t>09/07/2023</a:t>
             </a:fld>
             <a:endParaRPr lang="en-GB"/>
           </a:p>
@@ -456,7 +463,7 @@
           <a:p>
             <a:fld id="{FBCC5ECE-D7AB-49AB-A6D7-17BB3AE79EA8}" type="datetimeFigureOut">
               <a:rPr lang="en-GB" smtClean="0"/>
-              <a:t>06/07/2023</a:t>
+              <a:t>09/07/2023</a:t>
             </a:fld>
             <a:endParaRPr lang="en-GB"/>
           </a:p>
@@ -666,7 +673,7 @@
           <a:p>
             <a:fld id="{FBCC5ECE-D7AB-49AB-A6D7-17BB3AE79EA8}" type="datetimeFigureOut">
               <a:rPr lang="en-GB" smtClean="0"/>
-              <a:t>06/07/2023</a:t>
+              <a:t>09/07/2023</a:t>
             </a:fld>
             <a:endParaRPr lang="en-GB"/>
           </a:p>
@@ -866,7 +873,7 @@
           <a:p>
             <a:fld id="{FBCC5ECE-D7AB-49AB-A6D7-17BB3AE79EA8}" type="datetimeFigureOut">
               <a:rPr lang="en-GB" smtClean="0"/>
-              <a:t>06/07/2023</a:t>
+              <a:t>09/07/2023</a:t>
             </a:fld>
             <a:endParaRPr lang="en-GB"/>
           </a:p>
@@ -1142,7 +1149,7 @@
           <a:p>
             <a:fld id="{FBCC5ECE-D7AB-49AB-A6D7-17BB3AE79EA8}" type="datetimeFigureOut">
               <a:rPr lang="en-GB" smtClean="0"/>
-              <a:t>06/07/2023</a:t>
+              <a:t>09/07/2023</a:t>
             </a:fld>
             <a:endParaRPr lang="en-GB"/>
           </a:p>
@@ -1410,7 +1417,7 @@
           <a:p>
             <a:fld id="{FBCC5ECE-D7AB-49AB-A6D7-17BB3AE79EA8}" type="datetimeFigureOut">
               <a:rPr lang="en-GB" smtClean="0"/>
-              <a:t>06/07/2023</a:t>
+              <a:t>09/07/2023</a:t>
             </a:fld>
             <a:endParaRPr lang="en-GB"/>
           </a:p>
@@ -1825,7 +1832,7 @@
           <a:p>
             <a:fld id="{FBCC5ECE-D7AB-49AB-A6D7-17BB3AE79EA8}" type="datetimeFigureOut">
               <a:rPr lang="en-GB" smtClean="0"/>
-              <a:t>06/07/2023</a:t>
+              <a:t>09/07/2023</a:t>
             </a:fld>
             <a:endParaRPr lang="en-GB"/>
           </a:p>
@@ -1967,7 +1974,7 @@
           <a:p>
             <a:fld id="{FBCC5ECE-D7AB-49AB-A6D7-17BB3AE79EA8}" type="datetimeFigureOut">
               <a:rPr lang="en-GB" smtClean="0"/>
-              <a:t>06/07/2023</a:t>
+              <a:t>09/07/2023</a:t>
             </a:fld>
             <a:endParaRPr lang="en-GB"/>
           </a:p>
@@ -2080,7 +2087,7 @@
           <a:p>
             <a:fld id="{FBCC5ECE-D7AB-49AB-A6D7-17BB3AE79EA8}" type="datetimeFigureOut">
               <a:rPr lang="en-GB" smtClean="0"/>
-              <a:t>06/07/2023</a:t>
+              <a:t>09/07/2023</a:t>
             </a:fld>
             <a:endParaRPr lang="en-GB"/>
           </a:p>
@@ -2393,7 +2400,7 @@
           <a:p>
             <a:fld id="{FBCC5ECE-D7AB-49AB-A6D7-17BB3AE79EA8}" type="datetimeFigureOut">
               <a:rPr lang="en-GB" smtClean="0"/>
-              <a:t>06/07/2023</a:t>
+              <a:t>09/07/2023</a:t>
             </a:fld>
             <a:endParaRPr lang="en-GB"/>
           </a:p>
@@ -2682,7 +2689,7 @@
           <a:p>
             <a:fld id="{FBCC5ECE-D7AB-49AB-A6D7-17BB3AE79EA8}" type="datetimeFigureOut">
               <a:rPr lang="en-GB" smtClean="0"/>
-              <a:t>06/07/2023</a:t>
+              <a:t>09/07/2023</a:t>
             </a:fld>
             <a:endParaRPr lang="en-GB"/>
           </a:p>
@@ -2925,7 +2932,7 @@
           <a:p>
             <a:fld id="{FBCC5ECE-D7AB-49AB-A6D7-17BB3AE79EA8}" type="datetimeFigureOut">
               <a:rPr lang="en-GB" smtClean="0"/>
-              <a:t>06/07/2023</a:t>
+              <a:t>09/07/2023</a:t>
             </a:fld>
             <a:endParaRPr lang="en-GB"/>
           </a:p>
@@ -3524,6 +3531,665 @@
 </p:sld>
 </file>
 
+<file path=ppt/slides/slide2.xml><?xml version="1.0" encoding="utf-8"?>
+<p:sld xmlns:a="http://schemas.openxmlformats.org/drawingml/2006/main" xmlns:r="http://schemas.openxmlformats.org/officeDocument/2006/relationships" xmlns:p="http://schemas.openxmlformats.org/presentationml/2006/main">
+  <p:cSld>
+    <p:spTree>
+      <p:nvGrpSpPr>
+        <p:cNvPr id="1" name=""/>
+        <p:cNvGrpSpPr/>
+        <p:nvPr/>
+      </p:nvGrpSpPr>
+      <p:grpSpPr>
+        <a:xfrm>
+          <a:off x="0" y="0"/>
+          <a:ext cx="0" cy="0"/>
+          <a:chOff x="0" y="0"/>
+          <a:chExt cx="0" cy="0"/>
+        </a:xfrm>
+      </p:grpSpPr>
+      <p:sp>
+        <p:nvSpPr>
+          <p:cNvPr id="2" name="Title 1">
+            <a:extLst>
+              <a:ext uri="{FF2B5EF4-FFF2-40B4-BE49-F238E27FC236}">
+                <a16:creationId xmlns:a16="http://schemas.microsoft.com/office/drawing/2014/main" id="{AFD0DF21-9069-E787-3A9D-89D3868D4CD4}"/>
+              </a:ext>
+            </a:extLst>
+          </p:cNvPr>
+          <p:cNvSpPr>
+            <a:spLocks noGrp="1"/>
+          </p:cNvSpPr>
+          <p:nvPr>
+            <p:ph type="title"/>
+          </p:nvPr>
+        </p:nvSpPr>
+        <p:spPr/>
+        <p:txBody>
+          <a:bodyPr/>
+          <a:lstStyle/>
+          <a:p>
+            <a:r>
+              <a:rPr lang="fr-FR"/>
+              <a:t>BDD « receipts » – MCD</a:t>
+            </a:r>
+            <a:endParaRPr lang="en-GB" dirty="0"/>
+          </a:p>
+        </p:txBody>
+      </p:sp>
+      <p:graphicFrame>
+        <p:nvGraphicFramePr>
+          <p:cNvPr id="6" name="Object 5">
+            <a:extLst>
+              <a:ext uri="{FF2B5EF4-FFF2-40B4-BE49-F238E27FC236}">
+                <a16:creationId xmlns:a16="http://schemas.microsoft.com/office/drawing/2014/main" id="{98B4EA1A-7721-6D06-5F64-A734A547D058}"/>
+              </a:ext>
+            </a:extLst>
+          </p:cNvPr>
+          <p:cNvGraphicFramePr>
+            <a:graphicFrameLocks noChangeAspect="1"/>
+          </p:cNvGraphicFramePr>
+          <p:nvPr>
+            <p:extLst>
+              <p:ext uri="{D42A27DB-BD31-4B8C-83A1-F6EECF244321}">
+                <p14:modId xmlns:p14="http://schemas.microsoft.com/office/powerpoint/2010/main" val="3802908744"/>
+              </p:ext>
+            </p:extLst>
+          </p:nvPr>
+        </p:nvGraphicFramePr>
+        <p:xfrm>
+          <a:off x="3839492" y="1690688"/>
+          <a:ext cx="2000094" cy="1523006"/>
+        </p:xfrm>
+        <a:graphic>
+          <a:graphicData uri="http://schemas.openxmlformats.org/presentationml/2006/ole">
+            <mc:AlternateContent xmlns:mc="http://schemas.openxmlformats.org/markup-compatibility/2006">
+              <mc:Choice xmlns:v="urn:schemas-microsoft-com:vml" Requires="v">
+                <p:oleObj name="Worksheet" r:id="rId2" imgW="1211686" imgH="921886" progId="Excel.Sheet.12">
+                  <p:embed/>
+                </p:oleObj>
+              </mc:Choice>
+              <mc:Fallback>
+                <p:oleObj name="Worksheet" r:id="rId2" imgW="1211686" imgH="921886" progId="Excel.Sheet.12">
+                  <p:embed/>
+                  <p:pic>
+                    <p:nvPicPr>
+                      <p:cNvPr id="0" name=""/>
+                      <p:cNvPicPr/>
+                      <p:nvPr/>
+                    </p:nvPicPr>
+                    <p:blipFill>
+                      <a:blip r:embed="rId3"/>
+                      <a:stretch>
+                        <a:fillRect/>
+                      </a:stretch>
+                    </p:blipFill>
+                    <p:spPr>
+                      <a:xfrm>
+                        <a:off x="3839492" y="1690688"/>
+                        <a:ext cx="2000094" cy="1523006"/>
+                      </a:xfrm>
+                      <a:prstGeom prst="rect">
+                        <a:avLst/>
+                      </a:prstGeom>
+                    </p:spPr>
+                  </p:pic>
+                </p:oleObj>
+              </mc:Fallback>
+            </mc:AlternateContent>
+          </a:graphicData>
+        </a:graphic>
+      </p:graphicFrame>
+      <p:graphicFrame>
+        <p:nvGraphicFramePr>
+          <p:cNvPr id="8" name="Object 7">
+            <a:extLst>
+              <a:ext uri="{FF2B5EF4-FFF2-40B4-BE49-F238E27FC236}">
+                <a16:creationId xmlns:a16="http://schemas.microsoft.com/office/drawing/2014/main" id="{09FEB86A-4A43-DCE0-CD20-91084FA858C6}"/>
+              </a:ext>
+            </a:extLst>
+          </p:cNvPr>
+          <p:cNvGraphicFramePr>
+            <a:graphicFrameLocks noChangeAspect="1"/>
+          </p:cNvGraphicFramePr>
+          <p:nvPr>
+            <p:extLst>
+              <p:ext uri="{D42A27DB-BD31-4B8C-83A1-F6EECF244321}">
+                <p14:modId xmlns:p14="http://schemas.microsoft.com/office/powerpoint/2010/main" val="1607381600"/>
+              </p:ext>
+            </p:extLst>
+          </p:nvPr>
+        </p:nvGraphicFramePr>
+        <p:xfrm>
+          <a:off x="391573" y="3213694"/>
+          <a:ext cx="1375092" cy="1433671"/>
+        </p:xfrm>
+        <a:graphic>
+          <a:graphicData uri="http://schemas.openxmlformats.org/presentationml/2006/ole">
+            <mc:AlternateContent xmlns:mc="http://schemas.openxmlformats.org/markup-compatibility/2006">
+              <mc:Choice xmlns:v="urn:schemas-microsoft-com:vml" Requires="v">
+                <p:oleObj name="Worksheet" r:id="rId4" imgW="708554" imgH="738958" progId="Excel.Sheet.12">
+                  <p:embed/>
+                </p:oleObj>
+              </mc:Choice>
+              <mc:Fallback>
+                <p:oleObj name="Worksheet" r:id="rId4" imgW="708554" imgH="738958" progId="Excel.Sheet.12">
+                  <p:embed/>
+                  <p:pic>
+                    <p:nvPicPr>
+                      <p:cNvPr id="0" name=""/>
+                      <p:cNvPicPr/>
+                      <p:nvPr/>
+                    </p:nvPicPr>
+                    <p:blipFill>
+                      <a:blip r:embed="rId5"/>
+                      <a:stretch>
+                        <a:fillRect/>
+                      </a:stretch>
+                    </p:blipFill>
+                    <p:spPr>
+                      <a:xfrm>
+                        <a:off x="391573" y="3213694"/>
+                        <a:ext cx="1375092" cy="1433671"/>
+                      </a:xfrm>
+                      <a:prstGeom prst="rect">
+                        <a:avLst/>
+                      </a:prstGeom>
+                    </p:spPr>
+                  </p:pic>
+                </p:oleObj>
+              </mc:Fallback>
+            </mc:AlternateContent>
+          </a:graphicData>
+        </a:graphic>
+      </p:graphicFrame>
+      <p:graphicFrame>
+        <p:nvGraphicFramePr>
+          <p:cNvPr id="10" name="Object 9">
+            <a:extLst>
+              <a:ext uri="{FF2B5EF4-FFF2-40B4-BE49-F238E27FC236}">
+                <a16:creationId xmlns:a16="http://schemas.microsoft.com/office/drawing/2014/main" id="{5E7B786D-05F3-3784-543A-DDE2166A22D1}"/>
+              </a:ext>
+            </a:extLst>
+          </p:cNvPr>
+          <p:cNvGraphicFramePr>
+            <a:graphicFrameLocks noChangeAspect="1"/>
+          </p:cNvGraphicFramePr>
+          <p:nvPr>
+            <p:extLst>
+              <p:ext uri="{D42A27DB-BD31-4B8C-83A1-F6EECF244321}">
+                <p14:modId xmlns:p14="http://schemas.microsoft.com/office/powerpoint/2010/main" val="33597619"/>
+              </p:ext>
+            </p:extLst>
+          </p:nvPr>
+        </p:nvGraphicFramePr>
+        <p:xfrm>
+          <a:off x="7357866" y="2567831"/>
+          <a:ext cx="2000094" cy="1291726"/>
+        </p:xfrm>
+        <a:graphic>
+          <a:graphicData uri="http://schemas.openxmlformats.org/presentationml/2006/ole">
+            <mc:AlternateContent xmlns:mc="http://schemas.openxmlformats.org/markup-compatibility/2006">
+              <mc:Choice xmlns:v="urn:schemas-microsoft-com:vml" Requires="v">
+                <p:oleObj name="Worksheet" r:id="rId6" imgW="1143213" imgH="738958" progId="Excel.Sheet.12">
+                  <p:embed/>
+                </p:oleObj>
+              </mc:Choice>
+              <mc:Fallback>
+                <p:oleObj name="Worksheet" r:id="rId6" imgW="1143213" imgH="738958" progId="Excel.Sheet.12">
+                  <p:embed/>
+                  <p:pic>
+                    <p:nvPicPr>
+                      <p:cNvPr id="0" name=""/>
+                      <p:cNvPicPr/>
+                      <p:nvPr/>
+                    </p:nvPicPr>
+                    <p:blipFill>
+                      <a:blip r:embed="rId7"/>
+                      <a:stretch>
+                        <a:fillRect/>
+                      </a:stretch>
+                    </p:blipFill>
+                    <p:spPr>
+                      <a:xfrm>
+                        <a:off x="7357866" y="2567831"/>
+                        <a:ext cx="2000094" cy="1291726"/>
+                      </a:xfrm>
+                      <a:prstGeom prst="rect">
+                        <a:avLst/>
+                      </a:prstGeom>
+                    </p:spPr>
+                  </p:pic>
+                </p:oleObj>
+              </mc:Fallback>
+            </mc:AlternateContent>
+          </a:graphicData>
+        </a:graphic>
+      </p:graphicFrame>
+      <p:cxnSp>
+        <p:nvCxnSpPr>
+          <p:cNvPr id="11" name="Connecteur droit 17">
+            <a:extLst>
+              <a:ext uri="{FF2B5EF4-FFF2-40B4-BE49-F238E27FC236}">
+                <a16:creationId xmlns:a16="http://schemas.microsoft.com/office/drawing/2014/main" id="{036CE1E5-A0F0-C8A1-4156-13CAC83393B1}"/>
+              </a:ext>
+            </a:extLst>
+          </p:cNvPr>
+          <p:cNvCxnSpPr>
+            <a:cxnSpLocks/>
+            <a:stCxn id="8" idx="3"/>
+            <a:endCxn id="6" idx="1"/>
+          </p:cNvCxnSpPr>
+          <p:nvPr/>
+        </p:nvCxnSpPr>
+        <p:spPr>
+          <a:xfrm flipV="1">
+            <a:off x="1766665" y="2452191"/>
+            <a:ext cx="2072827" cy="1478338"/>
+          </a:xfrm>
+          <a:prstGeom prst="line">
+            <a:avLst/>
+          </a:prstGeom>
+          <a:ln w="28575"/>
+        </p:spPr>
+        <p:style>
+          <a:lnRef idx="1">
+            <a:schemeClr val="dk1"/>
+          </a:lnRef>
+          <a:fillRef idx="0">
+            <a:schemeClr val="dk1"/>
+          </a:fillRef>
+          <a:effectRef idx="0">
+            <a:schemeClr val="dk1"/>
+          </a:effectRef>
+          <a:fontRef idx="minor">
+            <a:schemeClr val="tx1"/>
+          </a:fontRef>
+        </p:style>
+      </p:cxnSp>
+      <p:sp>
+        <p:nvSpPr>
+          <p:cNvPr id="12" name="ZoneTexte 34">
+            <a:extLst>
+              <a:ext uri="{FF2B5EF4-FFF2-40B4-BE49-F238E27FC236}">
+                <a16:creationId xmlns:a16="http://schemas.microsoft.com/office/drawing/2014/main" id="{D63FF7D0-A185-B705-F840-DAFB123F88CF}"/>
+              </a:ext>
+            </a:extLst>
+          </p:cNvPr>
+          <p:cNvSpPr txBox="1"/>
+          <p:nvPr/>
+        </p:nvSpPr>
+        <p:spPr>
+          <a:xfrm>
+            <a:off x="1766665" y="3213694"/>
+            <a:ext cx="481222" cy="369332"/>
+          </a:xfrm>
+          <a:prstGeom prst="rect">
+            <a:avLst/>
+          </a:prstGeom>
+          <a:noFill/>
+        </p:spPr>
+        <p:txBody>
+          <a:bodyPr wrap="none" rtlCol="0">
+            <a:spAutoFit/>
+          </a:bodyPr>
+          <a:lstStyle/>
+          <a:p>
+            <a:r>
+              <a:rPr lang="fr-FR" dirty="0"/>
+              <a:t>0,n</a:t>
+            </a:r>
+          </a:p>
+        </p:txBody>
+      </p:sp>
+      <p:cxnSp>
+        <p:nvCxnSpPr>
+          <p:cNvPr id="16" name="Connecteur droit 17">
+            <a:extLst>
+              <a:ext uri="{FF2B5EF4-FFF2-40B4-BE49-F238E27FC236}">
+                <a16:creationId xmlns:a16="http://schemas.microsoft.com/office/drawing/2014/main" id="{08657B6B-CC1D-3181-F806-3EB1AD6A6330}"/>
+              </a:ext>
+            </a:extLst>
+          </p:cNvPr>
+          <p:cNvCxnSpPr>
+            <a:cxnSpLocks/>
+            <a:stCxn id="6" idx="3"/>
+            <a:endCxn id="10" idx="1"/>
+          </p:cNvCxnSpPr>
+          <p:nvPr/>
+        </p:nvCxnSpPr>
+        <p:spPr>
+          <a:xfrm>
+            <a:off x="5839586" y="2452191"/>
+            <a:ext cx="1518280" cy="761503"/>
+          </a:xfrm>
+          <a:prstGeom prst="line">
+            <a:avLst/>
+          </a:prstGeom>
+          <a:ln w="28575"/>
+        </p:spPr>
+        <p:style>
+          <a:lnRef idx="1">
+            <a:schemeClr val="dk1"/>
+          </a:lnRef>
+          <a:fillRef idx="0">
+            <a:schemeClr val="dk1"/>
+          </a:fillRef>
+          <a:effectRef idx="0">
+            <a:schemeClr val="dk1"/>
+          </a:effectRef>
+          <a:fontRef idx="minor">
+            <a:schemeClr val="tx1"/>
+          </a:fontRef>
+        </p:style>
+      </p:cxnSp>
+      <p:sp>
+        <p:nvSpPr>
+          <p:cNvPr id="17" name="ZoneTexte 34">
+            <a:extLst>
+              <a:ext uri="{FF2B5EF4-FFF2-40B4-BE49-F238E27FC236}">
+                <a16:creationId xmlns:a16="http://schemas.microsoft.com/office/drawing/2014/main" id="{526D7092-5341-B7DE-AB51-B5435FDC94B5}"/>
+              </a:ext>
+            </a:extLst>
+          </p:cNvPr>
+          <p:cNvSpPr txBox="1"/>
+          <p:nvPr/>
+        </p:nvSpPr>
+        <p:spPr>
+          <a:xfrm>
+            <a:off x="6745376" y="3213694"/>
+            <a:ext cx="476412" cy="369332"/>
+          </a:xfrm>
+          <a:prstGeom prst="rect">
+            <a:avLst/>
+          </a:prstGeom>
+          <a:noFill/>
+        </p:spPr>
+        <p:txBody>
+          <a:bodyPr wrap="none" rtlCol="0">
+            <a:spAutoFit/>
+          </a:bodyPr>
+          <a:lstStyle/>
+          <a:p>
+            <a:r>
+              <a:rPr lang="fr-FR" dirty="0"/>
+              <a:t>1,1</a:t>
+            </a:r>
+          </a:p>
+        </p:txBody>
+      </p:sp>
+      <p:sp>
+        <p:nvSpPr>
+          <p:cNvPr id="20" name="ZoneTexte 40">
+            <a:extLst>
+              <a:ext uri="{FF2B5EF4-FFF2-40B4-BE49-F238E27FC236}">
+                <a16:creationId xmlns:a16="http://schemas.microsoft.com/office/drawing/2014/main" id="{D9B61727-73C8-714B-0CB1-0B8CED3F7964}"/>
+              </a:ext>
+            </a:extLst>
+          </p:cNvPr>
+          <p:cNvSpPr txBox="1"/>
+          <p:nvPr/>
+        </p:nvSpPr>
+        <p:spPr>
+          <a:xfrm>
+            <a:off x="2247887" y="5123527"/>
+            <a:ext cx="6581417" cy="1477328"/>
+          </a:xfrm>
+          <a:prstGeom prst="rect">
+            <a:avLst/>
+          </a:prstGeom>
+          <a:noFill/>
+          <a:ln w="19050">
+            <a:solidFill>
+              <a:schemeClr val="accent6"/>
+            </a:solidFill>
+          </a:ln>
+        </p:spPr>
+        <p:txBody>
+          <a:bodyPr wrap="none" rtlCol="0">
+            <a:spAutoFit/>
+          </a:bodyPr>
+          <a:lstStyle/>
+          <a:p>
+            <a:r>
+              <a:rPr lang="fr-FR" b="1" dirty="0"/>
+              <a:t>MLD</a:t>
+            </a:r>
+          </a:p>
+          <a:p>
+            <a:r>
+              <a:rPr lang="fr-FR" dirty="0" err="1"/>
+              <a:t>Purchase</a:t>
+            </a:r>
+            <a:r>
+              <a:rPr lang="fr-FR" dirty="0"/>
+              <a:t>(</a:t>
+            </a:r>
+            <a:r>
+              <a:rPr lang="fr-FR" u="sng" dirty="0" err="1"/>
+              <a:t>time,#description</a:t>
+            </a:r>
+            <a:r>
+              <a:rPr lang="fr-FR" u="sng" dirty="0"/>
+              <a:t>, #merchant_name, #merchant_address)</a:t>
+            </a:r>
+            <a:endParaRPr lang="fr-FR" dirty="0"/>
+          </a:p>
+          <a:p>
+            <a:r>
+              <a:rPr lang="fr-FR" dirty="0"/>
+              <a:t>Article(</a:t>
+            </a:r>
+            <a:r>
+              <a:rPr lang="fr-FR" u="sng" dirty="0"/>
+              <a:t>description</a:t>
+            </a:r>
+            <a:r>
+              <a:rPr lang="fr-FR" dirty="0"/>
+              <a:t>, </a:t>
+            </a:r>
+            <a:r>
+              <a:rPr lang="fr-FR" dirty="0" err="1"/>
+              <a:t>amount</a:t>
+            </a:r>
+            <a:r>
+              <a:rPr lang="fr-FR" dirty="0"/>
+              <a:t>, flags)</a:t>
+            </a:r>
+          </a:p>
+          <a:p>
+            <a:r>
+              <a:rPr lang="fr-FR" dirty="0"/>
+              <a:t>Merchant(</a:t>
+            </a:r>
+            <a:r>
+              <a:rPr lang="fr-FR" u="sng" dirty="0" err="1"/>
+              <a:t>merchant_name,merchant_address,</a:t>
+            </a:r>
+            <a:r>
+              <a:rPr lang="fr-FR" dirty="0" err="1"/>
+              <a:t>country</a:t>
+            </a:r>
+            <a:r>
+              <a:rPr lang="fr-FR" dirty="0"/>
+              <a:t>)</a:t>
+            </a:r>
+          </a:p>
+          <a:p>
+            <a:endParaRPr lang="fr-FR" dirty="0"/>
+          </a:p>
+        </p:txBody>
+      </p:sp>
+      <p:sp>
+        <p:nvSpPr>
+          <p:cNvPr id="21" name="ZoneTexte 42">
+            <a:extLst>
+              <a:ext uri="{FF2B5EF4-FFF2-40B4-BE49-F238E27FC236}">
+                <a16:creationId xmlns:a16="http://schemas.microsoft.com/office/drawing/2014/main" id="{A23A7201-BD12-5A30-78DD-717F2FA1A4E1}"/>
+              </a:ext>
+            </a:extLst>
+          </p:cNvPr>
+          <p:cNvSpPr txBox="1"/>
+          <p:nvPr/>
+        </p:nvSpPr>
+        <p:spPr>
+          <a:xfrm>
+            <a:off x="4550479" y="1201269"/>
+            <a:ext cx="535724" cy="369332"/>
+          </a:xfrm>
+          <a:prstGeom prst="rect">
+            <a:avLst/>
+          </a:prstGeom>
+          <a:noFill/>
+        </p:spPr>
+        <p:txBody>
+          <a:bodyPr wrap="none" rtlCol="0">
+            <a:spAutoFit/>
+          </a:bodyPr>
+          <a:lstStyle/>
+          <a:p>
+            <a:r>
+              <a:rPr lang="fr-FR" dirty="0" err="1"/>
+              <a:t>Buy</a:t>
+            </a:r>
+            <a:endParaRPr lang="fr-FR" dirty="0"/>
+          </a:p>
+        </p:txBody>
+      </p:sp>
+      <p:sp>
+        <p:nvSpPr>
+          <p:cNvPr id="22" name="TextBox 21">
+            <a:extLst>
+              <a:ext uri="{FF2B5EF4-FFF2-40B4-BE49-F238E27FC236}">
+                <a16:creationId xmlns:a16="http://schemas.microsoft.com/office/drawing/2014/main" id="{FAC51340-6337-DCBC-CB63-A01CFC1E0F7F}"/>
+              </a:ext>
+            </a:extLst>
+          </p:cNvPr>
+          <p:cNvSpPr txBox="1"/>
+          <p:nvPr/>
+        </p:nvSpPr>
+        <p:spPr>
+          <a:xfrm>
+            <a:off x="4026568" y="3930529"/>
+            <a:ext cx="1294137" cy="369332"/>
+          </a:xfrm>
+          <a:prstGeom prst="rect">
+            <a:avLst/>
+          </a:prstGeom>
+          <a:noFill/>
+        </p:spPr>
+        <p:txBody>
+          <a:bodyPr wrap="none" rtlCol="0">
+            <a:spAutoFit/>
+          </a:bodyPr>
+          <a:lstStyle/>
+          <a:p>
+            <a:r>
+              <a:rPr lang="fr-FR" dirty="0"/>
+              <a:t>No </a:t>
+            </a:r>
+            <a:r>
+              <a:rPr lang="fr-FR" dirty="0" err="1"/>
+              <a:t>updated</a:t>
+            </a:r>
+            <a:endParaRPr lang="fr-FR" dirty="0"/>
+          </a:p>
+        </p:txBody>
+      </p:sp>
+    </p:spTree>
+    <p:extLst>
+      <p:ext uri="{BB962C8B-B14F-4D97-AF65-F5344CB8AC3E}">
+        <p14:creationId xmlns:p14="http://schemas.microsoft.com/office/powerpoint/2010/main" val="49566079"/>
+      </p:ext>
+    </p:extLst>
+  </p:cSld>
+  <p:clrMapOvr>
+    <a:masterClrMapping/>
+  </p:clrMapOvr>
+</p:sld>
+</file>
+
+<file path=ppt/slides/slide3.xml><?xml version="1.0" encoding="utf-8"?>
+<p:sld xmlns:a="http://schemas.openxmlformats.org/drawingml/2006/main" xmlns:r="http://schemas.openxmlformats.org/officeDocument/2006/relationships" xmlns:p="http://schemas.openxmlformats.org/presentationml/2006/main">
+  <p:cSld>
+    <p:spTree>
+      <p:nvGrpSpPr>
+        <p:cNvPr id="1" name=""/>
+        <p:cNvGrpSpPr/>
+        <p:nvPr/>
+      </p:nvGrpSpPr>
+      <p:grpSpPr>
+        <a:xfrm>
+          <a:off x="0" y="0"/>
+          <a:ext cx="0" cy="0"/>
+          <a:chOff x="0" y="0"/>
+          <a:chExt cx="0" cy="0"/>
+        </a:xfrm>
+      </p:grpSpPr>
+      <p:sp>
+        <p:nvSpPr>
+          <p:cNvPr id="4" name="TextBox 3">
+            <a:extLst>
+              <a:ext uri="{FF2B5EF4-FFF2-40B4-BE49-F238E27FC236}">
+                <a16:creationId xmlns:a16="http://schemas.microsoft.com/office/drawing/2014/main" id="{FF8424C8-9031-7028-4837-0FEE7EC75B55}"/>
+              </a:ext>
+            </a:extLst>
+          </p:cNvPr>
+          <p:cNvSpPr txBox="1"/>
+          <p:nvPr/>
+        </p:nvSpPr>
+        <p:spPr>
+          <a:xfrm>
+            <a:off x="978567" y="2274838"/>
+            <a:ext cx="7122695" cy="1200329"/>
+          </a:xfrm>
+          <a:prstGeom prst="rect">
+            <a:avLst/>
+          </a:prstGeom>
+          <a:noFill/>
+        </p:spPr>
+        <p:txBody>
+          <a:bodyPr wrap="square">
+            <a:spAutoFit/>
+          </a:bodyPr>
+          <a:lstStyle/>
+          <a:p>
+            <a:r>
+              <a:rPr lang="en-GB" dirty="0"/>
+              <a:t>CREATE TABLE receipts (time TIMESTAMPTZ NOT NULL, description TEXT NOT NULL, amount DOUBLE PRECISION NULL, flag TEXT NULL, </a:t>
+            </a:r>
+            <a:r>
+              <a:rPr lang="en-GB" dirty="0" err="1"/>
+              <a:t>merchant_name</a:t>
+            </a:r>
+            <a:r>
+              <a:rPr lang="en-GB" dirty="0"/>
+              <a:t> TEXT NOT NULL, </a:t>
+            </a:r>
+            <a:r>
+              <a:rPr lang="en-GB" dirty="0" err="1"/>
+              <a:t>merchant_address</a:t>
+            </a:r>
+            <a:r>
+              <a:rPr lang="en-GB" dirty="0"/>
+              <a:t> TEXT NOT NULL, country TEXT NOT NULL);</a:t>
+            </a:r>
+          </a:p>
+        </p:txBody>
+      </p:sp>
+    </p:spTree>
+    <p:extLst>
+      <p:ext uri="{BB962C8B-B14F-4D97-AF65-F5344CB8AC3E}">
+        <p14:creationId xmlns:p14="http://schemas.microsoft.com/office/powerpoint/2010/main" val="3686027051"/>
+      </p:ext>
+    </p:extLst>
+  </p:cSld>
+  <p:clrMapOvr>
+    <a:masterClrMapping/>
+  </p:clrMapOvr>
+</p:sld>
+</file>
+
 <file path=ppt/theme/theme1.xml><?xml version="1.0" encoding="utf-8"?>
 <a:theme xmlns:a="http://schemas.openxmlformats.org/drawingml/2006/main" name="Office Theme">
   <a:themeElements>

</xml_diff>